<commit_message>
release 1.0 working in local development environment as well in docker
</commit_message>
<xml_diff>
--- a/design/Image Text Detection App Wireframe.pptx
+++ b/design/Image Text Detection App Wireframe.pptx
@@ -4,9 +4,14 @@
   <p:sldMasterIdLst>
     <p:sldMasterId id="2147483648" r:id="rId1"/>
   </p:sldMasterIdLst>
+  <p:notesMasterIdLst>
+    <p:notesMasterId r:id="rId6"/>
+  </p:notesMasterIdLst>
   <p:sldIdLst>
     <p:sldId id="256" r:id="rId2"/>
     <p:sldId id="257" r:id="rId3"/>
+    <p:sldId id="259" r:id="rId4"/>
+    <p:sldId id="258" r:id="rId5"/>
   </p:sldIdLst>
   <p:sldSz cx="12192000" cy="6858000"/>
   <p:notesSz cx="6858000" cy="9144000"/>
@@ -105,7 +110,362 @@
       </a:defRPr>
     </a:lvl9pPr>
   </p:defaultTextStyle>
+  <p:extLst>
+    <p:ext uri="{EFAFB233-063F-42B5-8137-9DF3F51BA10A}">
+      <p15:sldGuideLst xmlns:p15="http://schemas.microsoft.com/office/powerpoint/2012/main"/>
+    </p:ext>
+  </p:extLst>
 </p:presentation>
+</file>
+
+<file path=ppt/notesMasters/notesMaster1.xml><?xml version="1.0" encoding="utf-8"?>
+<p:notesMaster xmlns:a="http://schemas.openxmlformats.org/drawingml/2006/main" xmlns:r="http://schemas.openxmlformats.org/officeDocument/2006/relationships" xmlns:p="http://schemas.openxmlformats.org/presentationml/2006/main">
+  <p:cSld>
+    <p:bg>
+      <p:bgRef idx="1001">
+        <a:schemeClr val="bg1"/>
+      </p:bgRef>
+    </p:bg>
+    <p:spTree>
+      <p:nvGrpSpPr>
+        <p:cNvPr id="1" name=""/>
+        <p:cNvGrpSpPr/>
+        <p:nvPr/>
+      </p:nvGrpSpPr>
+      <p:grpSpPr>
+        <a:xfrm>
+          <a:off x="0" y="0"/>
+          <a:ext cx="0" cy="0"/>
+          <a:chOff x="0" y="0"/>
+          <a:chExt cx="0" cy="0"/>
+        </a:xfrm>
+      </p:grpSpPr>
+      <p:sp>
+        <p:nvSpPr>
+          <p:cNvPr id="2" name="Header Placeholder 1"/>
+          <p:cNvSpPr>
+            <a:spLocks noGrp="1"/>
+          </p:cNvSpPr>
+          <p:nvPr>
+            <p:ph type="hdr" sz="quarter"/>
+          </p:nvPr>
+        </p:nvSpPr>
+        <p:spPr>
+          <a:xfrm>
+            <a:off x="0" y="0"/>
+            <a:ext cx="2971800" cy="458788"/>
+          </a:xfrm>
+          <a:prstGeom prst="rect">
+            <a:avLst/>
+          </a:prstGeom>
+        </p:spPr>
+        <p:txBody>
+          <a:bodyPr vert="horz" lIns="91440" tIns="45720" rIns="91440" bIns="45720" rtlCol="0"/>
+          <a:lstStyle>
+            <a:lvl1pPr algn="l">
+              <a:defRPr sz="1200"/>
+            </a:lvl1pPr>
+          </a:lstStyle>
+          <a:p>
+            <a:endParaRPr lang="en-CA"/>
+          </a:p>
+        </p:txBody>
+      </p:sp>
+      <p:sp>
+        <p:nvSpPr>
+          <p:cNvPr id="3" name="Date Placeholder 2"/>
+          <p:cNvSpPr>
+            <a:spLocks noGrp="1"/>
+          </p:cNvSpPr>
+          <p:nvPr>
+            <p:ph type="dt" idx="1"/>
+          </p:nvPr>
+        </p:nvSpPr>
+        <p:spPr>
+          <a:xfrm>
+            <a:off x="3884613" y="0"/>
+            <a:ext cx="2971800" cy="458788"/>
+          </a:xfrm>
+          <a:prstGeom prst="rect">
+            <a:avLst/>
+          </a:prstGeom>
+        </p:spPr>
+        <p:txBody>
+          <a:bodyPr vert="horz" lIns="91440" tIns="45720" rIns="91440" bIns="45720" rtlCol="0"/>
+          <a:lstStyle>
+            <a:lvl1pPr algn="r">
+              <a:defRPr sz="1200"/>
+            </a:lvl1pPr>
+          </a:lstStyle>
+          <a:p>
+            <a:fld id="{03EFC64A-EC4F-4CFC-B10D-8DFCE49DAF29}" type="datetimeFigureOut">
+              <a:rPr lang="en-CA" smtClean="0"/>
+              <a:t>2021-09-03</a:t>
+            </a:fld>
+            <a:endParaRPr lang="en-CA"/>
+          </a:p>
+        </p:txBody>
+      </p:sp>
+      <p:sp>
+        <p:nvSpPr>
+          <p:cNvPr id="4" name="Slide Image Placeholder 3"/>
+          <p:cNvSpPr>
+            <a:spLocks noGrp="1" noRot="1" noChangeAspect="1"/>
+          </p:cNvSpPr>
+          <p:nvPr>
+            <p:ph type="sldImg" idx="2"/>
+          </p:nvPr>
+        </p:nvSpPr>
+        <p:spPr>
+          <a:xfrm>
+            <a:off x="685800" y="1143000"/>
+            <a:ext cx="5486400" cy="3086100"/>
+          </a:xfrm>
+          <a:prstGeom prst="rect">
+            <a:avLst/>
+          </a:prstGeom>
+          <a:noFill/>
+          <a:ln w="12700">
+            <a:solidFill>
+              <a:prstClr val="black"/>
+            </a:solidFill>
+          </a:ln>
+        </p:spPr>
+        <p:txBody>
+          <a:bodyPr vert="horz" lIns="91440" tIns="45720" rIns="91440" bIns="45720" rtlCol="0" anchor="ctr"/>
+          <a:lstStyle/>
+          <a:p>
+            <a:endParaRPr lang="en-CA"/>
+          </a:p>
+        </p:txBody>
+      </p:sp>
+      <p:sp>
+        <p:nvSpPr>
+          <p:cNvPr id="5" name="Notes Placeholder 4"/>
+          <p:cNvSpPr>
+            <a:spLocks noGrp="1"/>
+          </p:cNvSpPr>
+          <p:nvPr>
+            <p:ph type="body" sz="quarter" idx="3"/>
+          </p:nvPr>
+        </p:nvSpPr>
+        <p:spPr>
+          <a:xfrm>
+            <a:off x="685800" y="4400550"/>
+            <a:ext cx="5486400" cy="3600450"/>
+          </a:xfrm>
+          <a:prstGeom prst="rect">
+            <a:avLst/>
+          </a:prstGeom>
+        </p:spPr>
+        <p:txBody>
+          <a:bodyPr vert="horz" lIns="91440" tIns="45720" rIns="91440" bIns="45720" rtlCol="0"/>
+          <a:lstStyle/>
+          <a:p>
+            <a:pPr lvl="0"/>
+            <a:r>
+              <a:rPr lang="en-US"/>
+              <a:t>Click to edit Master text styles</a:t>
+            </a:r>
+          </a:p>
+          <a:p>
+            <a:pPr lvl="1"/>
+            <a:r>
+              <a:rPr lang="en-US"/>
+              <a:t>Second level</a:t>
+            </a:r>
+          </a:p>
+          <a:p>
+            <a:pPr lvl="2"/>
+            <a:r>
+              <a:rPr lang="en-US"/>
+              <a:t>Third level</a:t>
+            </a:r>
+          </a:p>
+          <a:p>
+            <a:pPr lvl="3"/>
+            <a:r>
+              <a:rPr lang="en-US"/>
+              <a:t>Fourth level</a:t>
+            </a:r>
+          </a:p>
+          <a:p>
+            <a:pPr lvl="4"/>
+            <a:r>
+              <a:rPr lang="en-US"/>
+              <a:t>Fifth level</a:t>
+            </a:r>
+            <a:endParaRPr lang="en-CA"/>
+          </a:p>
+        </p:txBody>
+      </p:sp>
+      <p:sp>
+        <p:nvSpPr>
+          <p:cNvPr id="6" name="Footer Placeholder 5"/>
+          <p:cNvSpPr>
+            <a:spLocks noGrp="1"/>
+          </p:cNvSpPr>
+          <p:nvPr>
+            <p:ph type="ftr" sz="quarter" idx="4"/>
+          </p:nvPr>
+        </p:nvSpPr>
+        <p:spPr>
+          <a:xfrm>
+            <a:off x="0" y="8685213"/>
+            <a:ext cx="2971800" cy="458787"/>
+          </a:xfrm>
+          <a:prstGeom prst="rect">
+            <a:avLst/>
+          </a:prstGeom>
+        </p:spPr>
+        <p:txBody>
+          <a:bodyPr vert="horz" lIns="91440" tIns="45720" rIns="91440" bIns="45720" rtlCol="0" anchor="b"/>
+          <a:lstStyle>
+            <a:lvl1pPr algn="l">
+              <a:defRPr sz="1200"/>
+            </a:lvl1pPr>
+          </a:lstStyle>
+          <a:p>
+            <a:endParaRPr lang="en-CA"/>
+          </a:p>
+        </p:txBody>
+      </p:sp>
+      <p:sp>
+        <p:nvSpPr>
+          <p:cNvPr id="7" name="Slide Number Placeholder 6"/>
+          <p:cNvSpPr>
+            <a:spLocks noGrp="1"/>
+          </p:cNvSpPr>
+          <p:nvPr>
+            <p:ph type="sldNum" sz="quarter" idx="5"/>
+          </p:nvPr>
+        </p:nvSpPr>
+        <p:spPr>
+          <a:xfrm>
+            <a:off x="3884613" y="8685213"/>
+            <a:ext cx="2971800" cy="458787"/>
+          </a:xfrm>
+          <a:prstGeom prst="rect">
+            <a:avLst/>
+          </a:prstGeom>
+        </p:spPr>
+        <p:txBody>
+          <a:bodyPr vert="horz" lIns="91440" tIns="45720" rIns="91440" bIns="45720" rtlCol="0" anchor="b"/>
+          <a:lstStyle>
+            <a:lvl1pPr algn="r">
+              <a:defRPr sz="1200"/>
+            </a:lvl1pPr>
+          </a:lstStyle>
+          <a:p>
+            <a:fld id="{CD0333B8-CF5B-420A-A7D4-A3CB5AA511FF}" type="slidenum">
+              <a:rPr lang="en-CA" smtClean="0"/>
+              <a:t>‹#›</a:t>
+            </a:fld>
+            <a:endParaRPr lang="en-CA"/>
+          </a:p>
+        </p:txBody>
+      </p:sp>
+    </p:spTree>
+    <p:extLst>
+      <p:ext uri="{BB962C8B-B14F-4D97-AF65-F5344CB8AC3E}">
+        <p14:creationId xmlns:p14="http://schemas.microsoft.com/office/powerpoint/2010/main" val="2990376204"/>
+      </p:ext>
+    </p:extLst>
+  </p:cSld>
+  <p:clrMap bg1="lt1" tx1="dk1" bg2="lt2" tx2="dk2" accent1="accent1" accent2="accent2" accent3="accent3" accent4="accent4" accent5="accent5" accent6="accent6" hlink="hlink" folHlink="folHlink"/>
+  <p:notesStyle>
+    <a:lvl1pPr marL="0" algn="l" defTabSz="914400" rtl="0" eaLnBrk="1" latinLnBrk="0" hangingPunct="1">
+      <a:defRPr sz="1200" kern="1200">
+        <a:solidFill>
+          <a:schemeClr val="tx1"/>
+        </a:solidFill>
+        <a:latin typeface="+mn-lt"/>
+        <a:ea typeface="+mn-ea"/>
+        <a:cs typeface="+mn-cs"/>
+      </a:defRPr>
+    </a:lvl1pPr>
+    <a:lvl2pPr marL="457200" algn="l" defTabSz="914400" rtl="0" eaLnBrk="1" latinLnBrk="0" hangingPunct="1">
+      <a:defRPr sz="1200" kern="1200">
+        <a:solidFill>
+          <a:schemeClr val="tx1"/>
+        </a:solidFill>
+        <a:latin typeface="+mn-lt"/>
+        <a:ea typeface="+mn-ea"/>
+        <a:cs typeface="+mn-cs"/>
+      </a:defRPr>
+    </a:lvl2pPr>
+    <a:lvl3pPr marL="914400" algn="l" defTabSz="914400" rtl="0" eaLnBrk="1" latinLnBrk="0" hangingPunct="1">
+      <a:defRPr sz="1200" kern="1200">
+        <a:solidFill>
+          <a:schemeClr val="tx1"/>
+        </a:solidFill>
+        <a:latin typeface="+mn-lt"/>
+        <a:ea typeface="+mn-ea"/>
+        <a:cs typeface="+mn-cs"/>
+      </a:defRPr>
+    </a:lvl3pPr>
+    <a:lvl4pPr marL="1371600" algn="l" defTabSz="914400" rtl="0" eaLnBrk="1" latinLnBrk="0" hangingPunct="1">
+      <a:defRPr sz="1200" kern="1200">
+        <a:solidFill>
+          <a:schemeClr val="tx1"/>
+        </a:solidFill>
+        <a:latin typeface="+mn-lt"/>
+        <a:ea typeface="+mn-ea"/>
+        <a:cs typeface="+mn-cs"/>
+      </a:defRPr>
+    </a:lvl4pPr>
+    <a:lvl5pPr marL="1828800" algn="l" defTabSz="914400" rtl="0" eaLnBrk="1" latinLnBrk="0" hangingPunct="1">
+      <a:defRPr sz="1200" kern="1200">
+        <a:solidFill>
+          <a:schemeClr val="tx1"/>
+        </a:solidFill>
+        <a:latin typeface="+mn-lt"/>
+        <a:ea typeface="+mn-ea"/>
+        <a:cs typeface="+mn-cs"/>
+      </a:defRPr>
+    </a:lvl5pPr>
+    <a:lvl6pPr marL="2286000" algn="l" defTabSz="914400" rtl="0" eaLnBrk="1" latinLnBrk="0" hangingPunct="1">
+      <a:defRPr sz="1200" kern="1200">
+        <a:solidFill>
+          <a:schemeClr val="tx1"/>
+        </a:solidFill>
+        <a:latin typeface="+mn-lt"/>
+        <a:ea typeface="+mn-ea"/>
+        <a:cs typeface="+mn-cs"/>
+      </a:defRPr>
+    </a:lvl6pPr>
+    <a:lvl7pPr marL="2743200" algn="l" defTabSz="914400" rtl="0" eaLnBrk="1" latinLnBrk="0" hangingPunct="1">
+      <a:defRPr sz="1200" kern="1200">
+        <a:solidFill>
+          <a:schemeClr val="tx1"/>
+        </a:solidFill>
+        <a:latin typeface="+mn-lt"/>
+        <a:ea typeface="+mn-ea"/>
+        <a:cs typeface="+mn-cs"/>
+      </a:defRPr>
+    </a:lvl7pPr>
+    <a:lvl8pPr marL="3200400" algn="l" defTabSz="914400" rtl="0" eaLnBrk="1" latinLnBrk="0" hangingPunct="1">
+      <a:defRPr sz="1200" kern="1200">
+        <a:solidFill>
+          <a:schemeClr val="tx1"/>
+        </a:solidFill>
+        <a:latin typeface="+mn-lt"/>
+        <a:ea typeface="+mn-ea"/>
+        <a:cs typeface="+mn-cs"/>
+      </a:defRPr>
+    </a:lvl8pPr>
+    <a:lvl9pPr marL="3657600" algn="l" defTabSz="914400" rtl="0" eaLnBrk="1" latinLnBrk="0" hangingPunct="1">
+      <a:defRPr sz="1200" kern="1200">
+        <a:solidFill>
+          <a:schemeClr val="tx1"/>
+        </a:solidFill>
+        <a:latin typeface="+mn-lt"/>
+        <a:ea typeface="+mn-ea"/>
+        <a:cs typeface="+mn-cs"/>
+      </a:defRPr>
+    </a:lvl9pPr>
+  </p:notesStyle>
+</p:notesMaster>
 </file>
 
 <file path=ppt/slideLayouts/slideLayout1.xml><?xml version="1.0" encoding="utf-8"?>
@@ -255,9 +615,9 @@
           <a:bodyPr/>
           <a:lstStyle/>
           <a:p>
-            <a:fld id="{51C317DF-ACD0-4C7B-9AA8-1C82FACBD088}" type="datetimeFigureOut">
+            <a:fld id="{02EFAD4E-E378-48A8-8328-5D835CEB84F3}" type="datetime1">
               <a:rPr lang="en-CA" smtClean="0"/>
-              <a:t>2021-08-19</a:t>
+              <a:t>2021-09-03</a:t>
             </a:fld>
             <a:endParaRPr lang="en-CA"/>
           </a:p>
@@ -284,7 +644,10 @@
           <a:bodyPr/>
           <a:lstStyle/>
           <a:p>
-            <a:endParaRPr lang="en-CA"/>
+            <a:r>
+              <a:rPr lang="en-CA"/>
+              <a:t>Image Text Detection App</a:t>
+            </a:r>
           </a:p>
         </p:txBody>
       </p:sp>
@@ -455,9 +818,9 @@
           <a:bodyPr/>
           <a:lstStyle/>
           <a:p>
-            <a:fld id="{51C317DF-ACD0-4C7B-9AA8-1C82FACBD088}" type="datetimeFigureOut">
+            <a:fld id="{B8B4FDEF-B645-47FE-9A3C-BD87B6EB2B19}" type="datetime1">
               <a:rPr lang="en-CA" smtClean="0"/>
-              <a:t>2021-08-19</a:t>
+              <a:t>2021-09-03</a:t>
             </a:fld>
             <a:endParaRPr lang="en-CA"/>
           </a:p>
@@ -484,7 +847,10 @@
           <a:bodyPr/>
           <a:lstStyle/>
           <a:p>
-            <a:endParaRPr lang="en-CA"/>
+            <a:r>
+              <a:rPr lang="en-CA"/>
+              <a:t>Image Text Detection App</a:t>
+            </a:r>
           </a:p>
         </p:txBody>
       </p:sp>
@@ -665,9 +1031,9 @@
           <a:bodyPr/>
           <a:lstStyle/>
           <a:p>
-            <a:fld id="{51C317DF-ACD0-4C7B-9AA8-1C82FACBD088}" type="datetimeFigureOut">
+            <a:fld id="{80A9FA6C-E9C6-4BD3-B863-8323EB5964FC}" type="datetime1">
               <a:rPr lang="en-CA" smtClean="0"/>
-              <a:t>2021-08-19</a:t>
+              <a:t>2021-09-03</a:t>
             </a:fld>
             <a:endParaRPr lang="en-CA"/>
           </a:p>
@@ -694,7 +1060,10 @@
           <a:bodyPr/>
           <a:lstStyle/>
           <a:p>
-            <a:endParaRPr lang="en-CA"/>
+            <a:r>
+              <a:rPr lang="en-CA"/>
+              <a:t>Image Text Detection App</a:t>
+            </a:r>
           </a:p>
         </p:txBody>
       </p:sp>
@@ -865,9 +1234,9 @@
           <a:bodyPr/>
           <a:lstStyle/>
           <a:p>
-            <a:fld id="{51C317DF-ACD0-4C7B-9AA8-1C82FACBD088}" type="datetimeFigureOut">
+            <a:fld id="{0098A3E0-B0AC-4C04-BD62-41FF7C325979}" type="datetime1">
               <a:rPr lang="en-CA" smtClean="0"/>
-              <a:t>2021-08-19</a:t>
+              <a:t>2021-09-03</a:t>
             </a:fld>
             <a:endParaRPr lang="en-CA"/>
           </a:p>
@@ -894,7 +1263,10 @@
           <a:bodyPr/>
           <a:lstStyle/>
           <a:p>
-            <a:endParaRPr lang="en-CA"/>
+            <a:r>
+              <a:rPr lang="en-CA"/>
+              <a:t>Image Text Detection App</a:t>
+            </a:r>
           </a:p>
         </p:txBody>
       </p:sp>
@@ -1141,9 +1513,9 @@
           <a:bodyPr/>
           <a:lstStyle/>
           <a:p>
-            <a:fld id="{51C317DF-ACD0-4C7B-9AA8-1C82FACBD088}" type="datetimeFigureOut">
+            <a:fld id="{E4E980C5-BE13-4975-B280-5E8C36AE3294}" type="datetime1">
               <a:rPr lang="en-CA" smtClean="0"/>
-              <a:t>2021-08-19</a:t>
+              <a:t>2021-09-03</a:t>
             </a:fld>
             <a:endParaRPr lang="en-CA"/>
           </a:p>
@@ -1170,7 +1542,10 @@
           <a:bodyPr/>
           <a:lstStyle/>
           <a:p>
-            <a:endParaRPr lang="en-CA"/>
+            <a:r>
+              <a:rPr lang="en-CA"/>
+              <a:t>Image Text Detection App</a:t>
+            </a:r>
           </a:p>
         </p:txBody>
       </p:sp>
@@ -1409,9 +1784,9 @@
           <a:bodyPr/>
           <a:lstStyle/>
           <a:p>
-            <a:fld id="{51C317DF-ACD0-4C7B-9AA8-1C82FACBD088}" type="datetimeFigureOut">
+            <a:fld id="{37758D2A-DAF1-4590-82A4-D01CC505F545}" type="datetime1">
               <a:rPr lang="en-CA" smtClean="0"/>
-              <a:t>2021-08-19</a:t>
+              <a:t>2021-09-03</a:t>
             </a:fld>
             <a:endParaRPr lang="en-CA"/>
           </a:p>
@@ -1438,7 +1813,10 @@
           <a:bodyPr/>
           <a:lstStyle/>
           <a:p>
-            <a:endParaRPr lang="en-CA"/>
+            <a:r>
+              <a:rPr lang="en-CA"/>
+              <a:t>Image Text Detection App</a:t>
+            </a:r>
           </a:p>
         </p:txBody>
       </p:sp>
@@ -1824,9 +2202,9 @@
           <a:bodyPr/>
           <a:lstStyle/>
           <a:p>
-            <a:fld id="{51C317DF-ACD0-4C7B-9AA8-1C82FACBD088}" type="datetimeFigureOut">
+            <a:fld id="{6594BBFD-AA67-40CE-BB96-59D693676B5A}" type="datetime1">
               <a:rPr lang="en-CA" smtClean="0"/>
-              <a:t>2021-08-19</a:t>
+              <a:t>2021-09-03</a:t>
             </a:fld>
             <a:endParaRPr lang="en-CA"/>
           </a:p>
@@ -1853,7 +2231,10 @@
           <a:bodyPr/>
           <a:lstStyle/>
           <a:p>
-            <a:endParaRPr lang="en-CA"/>
+            <a:r>
+              <a:rPr lang="en-CA"/>
+              <a:t>Image Text Detection App</a:t>
+            </a:r>
           </a:p>
         </p:txBody>
       </p:sp>
@@ -1966,9 +2347,9 @@
           <a:bodyPr/>
           <a:lstStyle/>
           <a:p>
-            <a:fld id="{51C317DF-ACD0-4C7B-9AA8-1C82FACBD088}" type="datetimeFigureOut">
+            <a:fld id="{CF878D37-B44E-42A0-9CD1-E81E7764452B}" type="datetime1">
               <a:rPr lang="en-CA" smtClean="0"/>
-              <a:t>2021-08-19</a:t>
+              <a:t>2021-09-03</a:t>
             </a:fld>
             <a:endParaRPr lang="en-CA"/>
           </a:p>
@@ -1995,7 +2376,10 @@
           <a:bodyPr/>
           <a:lstStyle/>
           <a:p>
-            <a:endParaRPr lang="en-CA"/>
+            <a:r>
+              <a:rPr lang="en-CA"/>
+              <a:t>Image Text Detection App</a:t>
+            </a:r>
           </a:p>
         </p:txBody>
       </p:sp>
@@ -2079,9 +2463,9 @@
           <a:bodyPr/>
           <a:lstStyle/>
           <a:p>
-            <a:fld id="{51C317DF-ACD0-4C7B-9AA8-1C82FACBD088}" type="datetimeFigureOut">
+            <a:fld id="{91CA9CA6-AAB7-42ED-A8EA-028B53393041}" type="datetime1">
               <a:rPr lang="en-CA" smtClean="0"/>
-              <a:t>2021-08-19</a:t>
+              <a:t>2021-09-03</a:t>
             </a:fld>
             <a:endParaRPr lang="en-CA"/>
           </a:p>
@@ -2108,7 +2492,10 @@
           <a:bodyPr/>
           <a:lstStyle/>
           <a:p>
-            <a:endParaRPr lang="en-CA"/>
+            <a:r>
+              <a:rPr lang="en-CA"/>
+              <a:t>Image Text Detection App</a:t>
+            </a:r>
           </a:p>
         </p:txBody>
       </p:sp>
@@ -2392,9 +2779,9 @@
           <a:bodyPr/>
           <a:lstStyle/>
           <a:p>
-            <a:fld id="{51C317DF-ACD0-4C7B-9AA8-1C82FACBD088}" type="datetimeFigureOut">
+            <a:fld id="{30AF20C9-0756-4EF5-BB22-5D40DA921C8F}" type="datetime1">
               <a:rPr lang="en-CA" smtClean="0"/>
-              <a:t>2021-08-19</a:t>
+              <a:t>2021-09-03</a:t>
             </a:fld>
             <a:endParaRPr lang="en-CA"/>
           </a:p>
@@ -2421,7 +2808,10 @@
           <a:bodyPr/>
           <a:lstStyle/>
           <a:p>
-            <a:endParaRPr lang="en-CA"/>
+            <a:r>
+              <a:rPr lang="en-CA"/>
+              <a:t>Image Text Detection App</a:t>
+            </a:r>
           </a:p>
         </p:txBody>
       </p:sp>
@@ -2681,9 +3071,9 @@
           <a:bodyPr/>
           <a:lstStyle/>
           <a:p>
-            <a:fld id="{51C317DF-ACD0-4C7B-9AA8-1C82FACBD088}" type="datetimeFigureOut">
+            <a:fld id="{65655266-9489-4394-8112-83F3DA75E1C0}" type="datetime1">
               <a:rPr lang="en-CA" smtClean="0"/>
-              <a:t>2021-08-19</a:t>
+              <a:t>2021-09-03</a:t>
             </a:fld>
             <a:endParaRPr lang="en-CA"/>
           </a:p>
@@ -2710,7 +3100,10 @@
           <a:bodyPr/>
           <a:lstStyle/>
           <a:p>
-            <a:endParaRPr lang="en-CA"/>
+            <a:r>
+              <a:rPr lang="en-CA"/>
+              <a:t>Image Text Detection App</a:t>
+            </a:r>
           </a:p>
         </p:txBody>
       </p:sp>
@@ -2924,9 +3317,9 @@
             </a:lvl1pPr>
           </a:lstStyle>
           <a:p>
-            <a:fld id="{51C317DF-ACD0-4C7B-9AA8-1C82FACBD088}" type="datetimeFigureOut">
+            <a:fld id="{11FC675D-3763-4D5E-8011-C72C9BAE74AE}" type="datetime1">
               <a:rPr lang="en-CA" smtClean="0"/>
-              <a:t>2021-08-19</a:t>
+              <a:t>2021-09-03</a:t>
             </a:fld>
             <a:endParaRPr lang="en-CA"/>
           </a:p>
@@ -2971,7 +3364,10 @@
             </a:lvl1pPr>
           </a:lstStyle>
           <a:p>
-            <a:endParaRPr lang="en-CA"/>
+            <a:r>
+              <a:rPr lang="en-CA"/>
+              <a:t>Image Text Detection App</a:t>
+            </a:r>
           </a:p>
         </p:txBody>
       </p:sp>
@@ -3043,6 +3439,7 @@
     <p:sldLayoutId id="2147483658" r:id="rId10"/>
     <p:sldLayoutId id="2147483659" r:id="rId11"/>
   </p:sldLayoutIdLst>
+  <p:hf hdr="0" dt="0"/>
   <p:txStyles>
     <p:titleStyle>
       <a:lvl1pPr algn="l" defTabSz="914400" rtl="0" eaLnBrk="1" latinLnBrk="0" hangingPunct="1">
@@ -3374,18 +3771,18 @@
       </p:sp>
       <p:sp>
         <p:nvSpPr>
-          <p:cNvPr id="3" name="Subtitle 2">
-            <a:extLst>
-              <a:ext uri="{FF2B5EF4-FFF2-40B4-BE49-F238E27FC236}">
-                <a16:creationId xmlns:a16="http://schemas.microsoft.com/office/drawing/2014/main" id="{8DCE50EE-72F5-4E2C-8E45-7837E7718DB2}"/>
-              </a:ext>
-            </a:extLst>
-          </p:cNvPr>
-          <p:cNvSpPr>
-            <a:spLocks noGrp="1"/>
-          </p:cNvSpPr>
-          <p:nvPr>
-            <p:ph type="subTitle" idx="1"/>
+          <p:cNvPr id="4" name="Footer Placeholder 3">
+            <a:extLst>
+              <a:ext uri="{FF2B5EF4-FFF2-40B4-BE49-F238E27FC236}">
+                <a16:creationId xmlns:a16="http://schemas.microsoft.com/office/drawing/2014/main" id="{A20A734B-C549-4F42-A29F-46E4D062C5D4}"/>
+              </a:ext>
+            </a:extLst>
+          </p:cNvPr>
+          <p:cNvSpPr>
+            <a:spLocks noGrp="1"/>
+          </p:cNvSpPr>
+          <p:nvPr>
+            <p:ph type="ftr" sz="quarter" idx="11"/>
           </p:nvPr>
         </p:nvSpPr>
         <p:spPr/>
@@ -3394,14 +3791,38 @@
           <a:lstStyle/>
           <a:p>
             <a:r>
-              <a:rPr lang="en-US" dirty="0"/>
-              <a:t>Using Tesseract and </a:t>
-            </a:r>
-            <a:r>
-              <a:rPr lang="en-US" dirty="0" err="1"/>
-              <a:t>Tensorflow</a:t>
-            </a:r>
-            <a:endParaRPr lang="en-CA" dirty="0"/>
+              <a:rPr lang="en-CA"/>
+              <a:t>Image Text Detection App</a:t>
+            </a:r>
+          </a:p>
+        </p:txBody>
+      </p:sp>
+      <p:sp>
+        <p:nvSpPr>
+          <p:cNvPr id="5" name="Slide Number Placeholder 4">
+            <a:extLst>
+              <a:ext uri="{FF2B5EF4-FFF2-40B4-BE49-F238E27FC236}">
+                <a16:creationId xmlns:a16="http://schemas.microsoft.com/office/drawing/2014/main" id="{695C5407-D478-4D0A-B640-A0583181D02B}"/>
+              </a:ext>
+            </a:extLst>
+          </p:cNvPr>
+          <p:cNvSpPr>
+            <a:spLocks noGrp="1"/>
+          </p:cNvSpPr>
+          <p:nvPr>
+            <p:ph type="sldNum" sz="quarter" idx="12"/>
+          </p:nvPr>
+        </p:nvSpPr>
+        <p:spPr/>
+        <p:txBody>
+          <a:bodyPr/>
+          <a:lstStyle/>
+          <a:p>
+            <a:fld id="{596FB5DE-5539-4DDA-BEC9-CBF0F4979FCE}" type="slidenum">
+              <a:rPr lang="en-CA" smtClean="0"/>
+              <a:t>1</a:t>
+            </a:fld>
+            <a:endParaRPr lang="en-CA"/>
           </a:p>
         </p:txBody>
       </p:sp>
@@ -4070,10 +4491,873 @@
           </a:p>
         </p:txBody>
       </p:sp>
+      <p:sp>
+        <p:nvSpPr>
+          <p:cNvPr id="3" name="Footer Placeholder 2">
+            <a:extLst>
+              <a:ext uri="{FF2B5EF4-FFF2-40B4-BE49-F238E27FC236}">
+                <a16:creationId xmlns:a16="http://schemas.microsoft.com/office/drawing/2014/main" id="{83769DDA-D31E-4557-8C24-302BE77D25E6}"/>
+              </a:ext>
+            </a:extLst>
+          </p:cNvPr>
+          <p:cNvSpPr>
+            <a:spLocks noGrp="1"/>
+          </p:cNvSpPr>
+          <p:nvPr>
+            <p:ph type="ftr" sz="quarter" idx="11"/>
+          </p:nvPr>
+        </p:nvSpPr>
+        <p:spPr/>
+        <p:txBody>
+          <a:bodyPr/>
+          <a:lstStyle/>
+          <a:p>
+            <a:r>
+              <a:rPr lang="en-CA"/>
+              <a:t>Image Text Detection App</a:t>
+            </a:r>
+          </a:p>
+        </p:txBody>
+      </p:sp>
+      <p:sp>
+        <p:nvSpPr>
+          <p:cNvPr id="16" name="Slide Number Placeholder 15">
+            <a:extLst>
+              <a:ext uri="{FF2B5EF4-FFF2-40B4-BE49-F238E27FC236}">
+                <a16:creationId xmlns:a16="http://schemas.microsoft.com/office/drawing/2014/main" id="{80A96DE8-EA36-45B9-97D7-1B4CA0DD9174}"/>
+              </a:ext>
+            </a:extLst>
+          </p:cNvPr>
+          <p:cNvSpPr>
+            <a:spLocks noGrp="1"/>
+          </p:cNvSpPr>
+          <p:nvPr>
+            <p:ph type="sldNum" sz="quarter" idx="12"/>
+          </p:nvPr>
+        </p:nvSpPr>
+        <p:spPr/>
+        <p:txBody>
+          <a:bodyPr/>
+          <a:lstStyle/>
+          <a:p>
+            <a:fld id="{596FB5DE-5539-4DDA-BEC9-CBF0F4979FCE}" type="slidenum">
+              <a:rPr lang="en-CA" smtClean="0"/>
+              <a:t>2</a:t>
+            </a:fld>
+            <a:endParaRPr lang="en-CA"/>
+          </a:p>
+        </p:txBody>
+      </p:sp>
+      <p:sp>
+        <p:nvSpPr>
+          <p:cNvPr id="17" name="TextBox 16">
+            <a:extLst>
+              <a:ext uri="{FF2B5EF4-FFF2-40B4-BE49-F238E27FC236}">
+                <a16:creationId xmlns:a16="http://schemas.microsoft.com/office/drawing/2014/main" id="{A8AD27BA-1C21-4A16-A4FE-60A4F60E58B4}"/>
+              </a:ext>
+            </a:extLst>
+          </p:cNvPr>
+          <p:cNvSpPr txBox="1"/>
+          <p:nvPr/>
+        </p:nvSpPr>
+        <p:spPr>
+          <a:xfrm>
+            <a:off x="8313490" y="5595457"/>
+            <a:ext cx="2189527" cy="646331"/>
+          </a:xfrm>
+          <a:prstGeom prst="rect">
+            <a:avLst/>
+          </a:prstGeom>
+          <a:noFill/>
+        </p:spPr>
+        <p:txBody>
+          <a:bodyPr wrap="square" rtlCol="0">
+            <a:spAutoFit/>
+          </a:bodyPr>
+          <a:lstStyle/>
+          <a:p>
+            <a:r>
+              <a:rPr lang="en-US" dirty="0"/>
+              <a:t>Initial Draft Design of Landing Page</a:t>
+            </a:r>
+            <a:endParaRPr lang="en-CA" dirty="0"/>
+          </a:p>
+        </p:txBody>
+      </p:sp>
     </p:spTree>
     <p:extLst>
       <p:ext uri="{BB962C8B-B14F-4D97-AF65-F5344CB8AC3E}">
         <p14:creationId xmlns:p14="http://schemas.microsoft.com/office/powerpoint/2010/main" val="263159598"/>
+      </p:ext>
+    </p:extLst>
+  </p:cSld>
+  <p:clrMapOvr>
+    <a:masterClrMapping/>
+  </p:clrMapOvr>
+</p:sld>
+</file>
+
+<file path=ppt/slides/slide3.xml><?xml version="1.0" encoding="utf-8"?>
+<p:sld xmlns:a="http://schemas.openxmlformats.org/drawingml/2006/main" xmlns:r="http://schemas.openxmlformats.org/officeDocument/2006/relationships" xmlns:p="http://schemas.openxmlformats.org/presentationml/2006/main">
+  <p:cSld>
+    <p:spTree>
+      <p:nvGrpSpPr>
+        <p:cNvPr id="1" name=""/>
+        <p:cNvGrpSpPr/>
+        <p:nvPr/>
+      </p:nvGrpSpPr>
+      <p:grpSpPr>
+        <a:xfrm>
+          <a:off x="0" y="0"/>
+          <a:ext cx="0" cy="0"/>
+          <a:chOff x="0" y="0"/>
+          <a:chExt cx="0" cy="0"/>
+        </a:xfrm>
+      </p:grpSpPr>
+      <p:sp>
+        <p:nvSpPr>
+          <p:cNvPr id="2" name="Footer Placeholder 1">
+            <a:extLst>
+              <a:ext uri="{FF2B5EF4-FFF2-40B4-BE49-F238E27FC236}">
+                <a16:creationId xmlns:a16="http://schemas.microsoft.com/office/drawing/2014/main" id="{F6A5672B-793E-4A67-9523-002721404B33}"/>
+              </a:ext>
+            </a:extLst>
+          </p:cNvPr>
+          <p:cNvSpPr>
+            <a:spLocks noGrp="1"/>
+          </p:cNvSpPr>
+          <p:nvPr>
+            <p:ph type="ftr" sz="quarter" idx="11"/>
+          </p:nvPr>
+        </p:nvSpPr>
+        <p:spPr/>
+        <p:txBody>
+          <a:bodyPr/>
+          <a:lstStyle/>
+          <a:p>
+            <a:r>
+              <a:rPr lang="en-CA"/>
+              <a:t>Image Text Detection App</a:t>
+            </a:r>
+          </a:p>
+        </p:txBody>
+      </p:sp>
+      <p:sp>
+        <p:nvSpPr>
+          <p:cNvPr id="3" name="Slide Number Placeholder 2">
+            <a:extLst>
+              <a:ext uri="{FF2B5EF4-FFF2-40B4-BE49-F238E27FC236}">
+                <a16:creationId xmlns:a16="http://schemas.microsoft.com/office/drawing/2014/main" id="{336B2030-F087-4EC6-95E9-74B2C3BCA0F9}"/>
+              </a:ext>
+            </a:extLst>
+          </p:cNvPr>
+          <p:cNvSpPr>
+            <a:spLocks noGrp="1"/>
+          </p:cNvSpPr>
+          <p:nvPr>
+            <p:ph type="sldNum" sz="quarter" idx="12"/>
+          </p:nvPr>
+        </p:nvSpPr>
+        <p:spPr/>
+        <p:txBody>
+          <a:bodyPr/>
+          <a:lstStyle/>
+          <a:p>
+            <a:fld id="{596FB5DE-5539-4DDA-BEC9-CBF0F4979FCE}" type="slidenum">
+              <a:rPr lang="en-CA" smtClean="0"/>
+              <a:t>3</a:t>
+            </a:fld>
+            <a:endParaRPr lang="en-CA"/>
+          </a:p>
+        </p:txBody>
+      </p:sp>
+      <p:sp>
+        <p:nvSpPr>
+          <p:cNvPr id="4" name="TextBox 3">
+            <a:extLst>
+              <a:ext uri="{FF2B5EF4-FFF2-40B4-BE49-F238E27FC236}">
+                <a16:creationId xmlns:a16="http://schemas.microsoft.com/office/drawing/2014/main" id="{4098C89C-9004-4931-A219-EEC05C8CC6F9}"/>
+              </a:ext>
+            </a:extLst>
+          </p:cNvPr>
+          <p:cNvSpPr txBox="1"/>
+          <p:nvPr/>
+        </p:nvSpPr>
+        <p:spPr>
+          <a:xfrm>
+            <a:off x="172394" y="247896"/>
+            <a:ext cx="2380075" cy="646331"/>
+          </a:xfrm>
+          <a:prstGeom prst="rect">
+            <a:avLst/>
+          </a:prstGeom>
+          <a:noFill/>
+        </p:spPr>
+        <p:txBody>
+          <a:bodyPr wrap="square" rtlCol="0">
+            <a:spAutoFit/>
+          </a:bodyPr>
+          <a:lstStyle/>
+          <a:p>
+            <a:r>
+              <a:rPr lang="en-US" dirty="0"/>
+              <a:t>Actual Landing </a:t>
+            </a:r>
+            <a:br>
+              <a:rPr lang="en-US" dirty="0"/>
+            </a:br>
+            <a:r>
+              <a:rPr lang="en-US" dirty="0"/>
+              <a:t>Page with Release 1.0</a:t>
+            </a:r>
+            <a:endParaRPr lang="en-CA" dirty="0"/>
+          </a:p>
+        </p:txBody>
+      </p:sp>
+      <p:pic>
+        <p:nvPicPr>
+          <p:cNvPr id="7" name="Picture 6">
+            <a:extLst>
+              <a:ext uri="{FF2B5EF4-FFF2-40B4-BE49-F238E27FC236}">
+                <a16:creationId xmlns:a16="http://schemas.microsoft.com/office/drawing/2014/main" id="{325AFE22-A9E2-416D-AD90-68D1C6490B28}"/>
+              </a:ext>
+            </a:extLst>
+          </p:cNvPr>
+          <p:cNvPicPr>
+            <a:picLocks noChangeAspect="1"/>
+          </p:cNvPicPr>
+          <p:nvPr/>
+        </p:nvPicPr>
+        <p:blipFill>
+          <a:blip r:embed="rId2"/>
+          <a:stretch>
+            <a:fillRect/>
+          </a:stretch>
+        </p:blipFill>
+        <p:spPr>
+          <a:xfrm>
+            <a:off x="2552469" y="312015"/>
+            <a:ext cx="7087062" cy="5823080"/>
+          </a:xfrm>
+          <a:prstGeom prst="rect">
+            <a:avLst/>
+          </a:prstGeom>
+        </p:spPr>
+      </p:pic>
+    </p:spTree>
+    <p:extLst>
+      <p:ext uri="{BB962C8B-B14F-4D97-AF65-F5344CB8AC3E}">
+        <p14:creationId xmlns:p14="http://schemas.microsoft.com/office/powerpoint/2010/main" val="645369934"/>
+      </p:ext>
+    </p:extLst>
+  </p:cSld>
+  <p:clrMapOvr>
+    <a:masterClrMapping/>
+  </p:clrMapOvr>
+</p:sld>
+</file>
+
+<file path=ppt/slides/slide4.xml><?xml version="1.0" encoding="utf-8"?>
+<p:sld xmlns:a="http://schemas.openxmlformats.org/drawingml/2006/main" xmlns:r="http://schemas.openxmlformats.org/officeDocument/2006/relationships" xmlns:p="http://schemas.openxmlformats.org/presentationml/2006/main">
+  <p:cSld>
+    <p:spTree>
+      <p:nvGrpSpPr>
+        <p:cNvPr id="1" name=""/>
+        <p:cNvGrpSpPr/>
+        <p:nvPr/>
+      </p:nvGrpSpPr>
+      <p:grpSpPr>
+        <a:xfrm>
+          <a:off x="0" y="0"/>
+          <a:ext cx="0" cy="0"/>
+          <a:chOff x="0" y="0"/>
+          <a:chExt cx="0" cy="0"/>
+        </a:xfrm>
+      </p:grpSpPr>
+      <p:pic>
+        <p:nvPicPr>
+          <p:cNvPr id="3" name="Picture 2">
+            <a:extLst>
+              <a:ext uri="{FF2B5EF4-FFF2-40B4-BE49-F238E27FC236}">
+                <a16:creationId xmlns:a16="http://schemas.microsoft.com/office/drawing/2014/main" id="{207D9B65-B7DB-46DE-90F9-7F2D17A3E903}"/>
+              </a:ext>
+            </a:extLst>
+          </p:cNvPr>
+          <p:cNvPicPr>
+            <a:picLocks noChangeAspect="1"/>
+          </p:cNvPicPr>
+          <p:nvPr/>
+        </p:nvPicPr>
+        <p:blipFill>
+          <a:blip r:embed="rId2"/>
+          <a:stretch>
+            <a:fillRect/>
+          </a:stretch>
+        </p:blipFill>
+        <p:spPr>
+          <a:xfrm>
+            <a:off x="439622" y="2588763"/>
+            <a:ext cx="532966" cy="574704"/>
+          </a:xfrm>
+          <a:prstGeom prst="rect">
+            <a:avLst/>
+          </a:prstGeom>
+        </p:spPr>
+      </p:pic>
+      <p:pic>
+        <p:nvPicPr>
+          <p:cNvPr id="7" name="Picture 6">
+            <a:extLst>
+              <a:ext uri="{FF2B5EF4-FFF2-40B4-BE49-F238E27FC236}">
+                <a16:creationId xmlns:a16="http://schemas.microsoft.com/office/drawing/2014/main" id="{7B180B98-744C-4EB9-9B42-D4131F5605DE}"/>
+              </a:ext>
+            </a:extLst>
+          </p:cNvPr>
+          <p:cNvPicPr>
+            <a:picLocks noChangeAspect="1"/>
+          </p:cNvPicPr>
+          <p:nvPr/>
+        </p:nvPicPr>
+        <p:blipFill>
+          <a:blip r:embed="rId3"/>
+          <a:stretch>
+            <a:fillRect/>
+          </a:stretch>
+        </p:blipFill>
+        <p:spPr>
+          <a:xfrm>
+            <a:off x="8334529" y="704995"/>
+            <a:ext cx="774740" cy="908097"/>
+          </a:xfrm>
+          <a:prstGeom prst="rect">
+            <a:avLst/>
+          </a:prstGeom>
+        </p:spPr>
+      </p:pic>
+      <p:pic>
+        <p:nvPicPr>
+          <p:cNvPr id="9" name="Picture 8">
+            <a:extLst>
+              <a:ext uri="{FF2B5EF4-FFF2-40B4-BE49-F238E27FC236}">
+                <a16:creationId xmlns:a16="http://schemas.microsoft.com/office/drawing/2014/main" id="{BF18D93A-BBF6-4CD9-8176-DDA349B49734}"/>
+              </a:ext>
+            </a:extLst>
+          </p:cNvPr>
+          <p:cNvPicPr>
+            <a:picLocks noChangeAspect="1"/>
+          </p:cNvPicPr>
+          <p:nvPr/>
+        </p:nvPicPr>
+        <p:blipFill>
+          <a:blip r:embed="rId4"/>
+          <a:stretch>
+            <a:fillRect/>
+          </a:stretch>
+        </p:blipFill>
+        <p:spPr>
+          <a:xfrm>
+            <a:off x="4537886" y="2588763"/>
+            <a:ext cx="485800" cy="574704"/>
+          </a:xfrm>
+          <a:prstGeom prst="rect">
+            <a:avLst/>
+          </a:prstGeom>
+        </p:spPr>
+      </p:pic>
+      <p:pic>
+        <p:nvPicPr>
+          <p:cNvPr id="11" name="Picture 10">
+            <a:extLst>
+              <a:ext uri="{FF2B5EF4-FFF2-40B4-BE49-F238E27FC236}">
+                <a16:creationId xmlns:a16="http://schemas.microsoft.com/office/drawing/2014/main" id="{2BDB588A-228F-49BA-AED9-3A663C716CD0}"/>
+              </a:ext>
+            </a:extLst>
+          </p:cNvPr>
+          <p:cNvPicPr>
+            <a:picLocks noChangeAspect="1"/>
+          </p:cNvPicPr>
+          <p:nvPr/>
+        </p:nvPicPr>
+        <p:blipFill>
+          <a:blip r:embed="rId5"/>
+          <a:stretch>
+            <a:fillRect/>
+          </a:stretch>
+        </p:blipFill>
+        <p:spPr>
+          <a:xfrm>
+            <a:off x="8453598" y="2633215"/>
+            <a:ext cx="536603" cy="485800"/>
+          </a:xfrm>
+          <a:prstGeom prst="rect">
+            <a:avLst/>
+          </a:prstGeom>
+        </p:spPr>
+      </p:pic>
+      <p:cxnSp>
+        <p:nvCxnSpPr>
+          <p:cNvPr id="18" name="Straight Arrow Connector 17">
+            <a:extLst>
+              <a:ext uri="{FF2B5EF4-FFF2-40B4-BE49-F238E27FC236}">
+                <a16:creationId xmlns:a16="http://schemas.microsoft.com/office/drawing/2014/main" id="{CFCBFCB6-129A-48BA-97B4-FB3F4DAA21F3}"/>
+              </a:ext>
+            </a:extLst>
+          </p:cNvPr>
+          <p:cNvCxnSpPr>
+            <a:cxnSpLocks/>
+            <a:stCxn id="9" idx="3"/>
+            <a:endCxn id="11" idx="1"/>
+          </p:cNvCxnSpPr>
+          <p:nvPr/>
+        </p:nvCxnSpPr>
+        <p:spPr>
+          <a:xfrm>
+            <a:off x="5023686" y="2876115"/>
+            <a:ext cx="3429912" cy="0"/>
+          </a:xfrm>
+          <a:prstGeom prst="straightConnector1">
+            <a:avLst/>
+          </a:prstGeom>
+          <a:ln>
+            <a:headEnd type="triangle"/>
+            <a:tailEnd type="triangle"/>
+          </a:ln>
+        </p:spPr>
+        <p:style>
+          <a:lnRef idx="1">
+            <a:schemeClr val="accent1"/>
+          </a:lnRef>
+          <a:fillRef idx="0">
+            <a:schemeClr val="accent1"/>
+          </a:fillRef>
+          <a:effectRef idx="0">
+            <a:schemeClr val="accent1"/>
+          </a:effectRef>
+          <a:fontRef idx="minor">
+            <a:schemeClr val="tx1"/>
+          </a:fontRef>
+        </p:style>
+      </p:cxnSp>
+      <p:cxnSp>
+        <p:nvCxnSpPr>
+          <p:cNvPr id="26" name="Straight Arrow Connector 25">
+            <a:extLst>
+              <a:ext uri="{FF2B5EF4-FFF2-40B4-BE49-F238E27FC236}">
+                <a16:creationId xmlns:a16="http://schemas.microsoft.com/office/drawing/2014/main" id="{A8B09754-D1C9-4100-AE3D-211B65A012F8}"/>
+              </a:ext>
+            </a:extLst>
+          </p:cNvPr>
+          <p:cNvCxnSpPr>
+            <a:cxnSpLocks/>
+            <a:stCxn id="3" idx="3"/>
+            <a:endCxn id="9" idx="1"/>
+          </p:cNvCxnSpPr>
+          <p:nvPr/>
+        </p:nvCxnSpPr>
+        <p:spPr>
+          <a:xfrm>
+            <a:off x="972588" y="2876115"/>
+            <a:ext cx="3565298" cy="0"/>
+          </a:xfrm>
+          <a:prstGeom prst="straightConnector1">
+            <a:avLst/>
+          </a:prstGeom>
+          <a:ln>
+            <a:tailEnd type="triangle"/>
+          </a:ln>
+        </p:spPr>
+        <p:style>
+          <a:lnRef idx="1">
+            <a:schemeClr val="accent1"/>
+          </a:lnRef>
+          <a:fillRef idx="0">
+            <a:schemeClr val="accent1"/>
+          </a:fillRef>
+          <a:effectRef idx="0">
+            <a:schemeClr val="accent1"/>
+          </a:effectRef>
+          <a:fontRef idx="minor">
+            <a:schemeClr val="tx1"/>
+          </a:fontRef>
+        </p:style>
+      </p:cxnSp>
+      <p:cxnSp>
+        <p:nvCxnSpPr>
+          <p:cNvPr id="36" name="Connector: Elbow 35">
+            <a:extLst>
+              <a:ext uri="{FF2B5EF4-FFF2-40B4-BE49-F238E27FC236}">
+                <a16:creationId xmlns:a16="http://schemas.microsoft.com/office/drawing/2014/main" id="{0601D948-9894-482C-991C-517AC2440EBA}"/>
+              </a:ext>
+            </a:extLst>
+          </p:cNvPr>
+          <p:cNvCxnSpPr>
+            <a:cxnSpLocks/>
+            <a:stCxn id="9" idx="2"/>
+            <a:endCxn id="11" idx="2"/>
+          </p:cNvCxnSpPr>
+          <p:nvPr/>
+        </p:nvCxnSpPr>
+        <p:spPr>
+          <a:xfrm rot="5400000" flipH="1" flipV="1">
+            <a:off x="6729117" y="1170684"/>
+            <a:ext cx="44452" cy="3941114"/>
+          </a:xfrm>
+          <a:prstGeom prst="bentConnector3">
+            <a:avLst>
+              <a:gd name="adj1" fmla="val -3684763"/>
+            </a:avLst>
+          </a:prstGeom>
+          <a:ln>
+            <a:headEnd type="triangle"/>
+            <a:tailEnd type="triangle"/>
+          </a:ln>
+        </p:spPr>
+        <p:style>
+          <a:lnRef idx="1">
+            <a:schemeClr val="accent1"/>
+          </a:lnRef>
+          <a:fillRef idx="0">
+            <a:schemeClr val="accent1"/>
+          </a:fillRef>
+          <a:effectRef idx="0">
+            <a:schemeClr val="accent1"/>
+          </a:effectRef>
+          <a:fontRef idx="minor">
+            <a:schemeClr val="tx1"/>
+          </a:fontRef>
+        </p:style>
+      </p:cxnSp>
+      <p:sp>
+        <p:nvSpPr>
+          <p:cNvPr id="40" name="TextBox 39">
+            <a:extLst>
+              <a:ext uri="{FF2B5EF4-FFF2-40B4-BE49-F238E27FC236}">
+                <a16:creationId xmlns:a16="http://schemas.microsoft.com/office/drawing/2014/main" id="{EA0F8608-8744-4407-9BA7-342B30E5B728}"/>
+              </a:ext>
+            </a:extLst>
+          </p:cNvPr>
+          <p:cNvSpPr txBox="1"/>
+          <p:nvPr/>
+        </p:nvSpPr>
+        <p:spPr>
+          <a:xfrm>
+            <a:off x="5445654" y="4425167"/>
+            <a:ext cx="2471767" cy="276999"/>
+          </a:xfrm>
+          <a:prstGeom prst="rect">
+            <a:avLst/>
+          </a:prstGeom>
+          <a:noFill/>
+        </p:spPr>
+        <p:txBody>
+          <a:bodyPr wrap="none" rtlCol="0">
+            <a:spAutoFit/>
+          </a:bodyPr>
+          <a:lstStyle/>
+          <a:p>
+            <a:r>
+              <a:rPr lang="en-US" sz="1200" dirty="0">
+                <a:solidFill>
+                  <a:schemeClr val="tx1"/>
+                </a:solidFill>
+              </a:rPr>
+              <a:t>Call API (Port 80) for Text Extraction</a:t>
+            </a:r>
+            <a:endParaRPr lang="en-CA" sz="1200" dirty="0">
+              <a:solidFill>
+                <a:schemeClr val="tx1"/>
+              </a:solidFill>
+            </a:endParaRPr>
+          </a:p>
+        </p:txBody>
+      </p:sp>
+      <p:sp>
+        <p:nvSpPr>
+          <p:cNvPr id="51" name="TextBox 50">
+            <a:extLst>
+              <a:ext uri="{FF2B5EF4-FFF2-40B4-BE49-F238E27FC236}">
+                <a16:creationId xmlns:a16="http://schemas.microsoft.com/office/drawing/2014/main" id="{B0C3F8E0-F986-4794-A1DF-B34CD250312C}"/>
+              </a:ext>
+            </a:extLst>
+          </p:cNvPr>
+          <p:cNvSpPr txBox="1"/>
+          <p:nvPr/>
+        </p:nvSpPr>
+        <p:spPr>
+          <a:xfrm>
+            <a:off x="5783701" y="2571714"/>
+            <a:ext cx="1659429" cy="276999"/>
+          </a:xfrm>
+          <a:prstGeom prst="rect">
+            <a:avLst/>
+          </a:prstGeom>
+          <a:noFill/>
+        </p:spPr>
+        <p:txBody>
+          <a:bodyPr wrap="none" rtlCol="0">
+            <a:spAutoFit/>
+          </a:bodyPr>
+          <a:lstStyle/>
+          <a:p>
+            <a:r>
+              <a:rPr lang="en-US" sz="1200" dirty="0">
+                <a:solidFill>
+                  <a:schemeClr val="tx1"/>
+                </a:solidFill>
+              </a:rPr>
+              <a:t>Serve Website (Port 80)</a:t>
+            </a:r>
+            <a:endParaRPr lang="en-CA" sz="1200" dirty="0">
+              <a:solidFill>
+                <a:schemeClr val="tx1"/>
+              </a:solidFill>
+            </a:endParaRPr>
+          </a:p>
+        </p:txBody>
+      </p:sp>
+      <p:sp>
+        <p:nvSpPr>
+          <p:cNvPr id="57" name="TextBox 56">
+            <a:extLst>
+              <a:ext uri="{FF2B5EF4-FFF2-40B4-BE49-F238E27FC236}">
+                <a16:creationId xmlns:a16="http://schemas.microsoft.com/office/drawing/2014/main" id="{9E4D36F1-9B81-4001-8B89-381DD1BB13DE}"/>
+              </a:ext>
+            </a:extLst>
+          </p:cNvPr>
+          <p:cNvSpPr txBox="1"/>
+          <p:nvPr/>
+        </p:nvSpPr>
+        <p:spPr>
+          <a:xfrm>
+            <a:off x="1678846" y="2588763"/>
+            <a:ext cx="1837426" cy="276999"/>
+          </a:xfrm>
+          <a:prstGeom prst="rect">
+            <a:avLst/>
+          </a:prstGeom>
+          <a:noFill/>
+        </p:spPr>
+        <p:txBody>
+          <a:bodyPr wrap="none" rtlCol="0">
+            <a:spAutoFit/>
+          </a:bodyPr>
+          <a:lstStyle/>
+          <a:p>
+            <a:r>
+              <a:rPr lang="en-US" sz="1200" dirty="0">
+                <a:solidFill>
+                  <a:schemeClr val="tx1"/>
+                </a:solidFill>
+              </a:rPr>
+              <a:t>Access Website on </a:t>
+            </a:r>
+            <a:r>
+              <a:rPr lang="en-US" sz="1200" dirty="0"/>
+              <a:t>Port 80</a:t>
+            </a:r>
+            <a:endParaRPr lang="en-CA" sz="1200" dirty="0">
+              <a:solidFill>
+                <a:schemeClr val="tx1"/>
+              </a:solidFill>
+            </a:endParaRPr>
+          </a:p>
+        </p:txBody>
+      </p:sp>
+      <p:sp>
+        <p:nvSpPr>
+          <p:cNvPr id="61" name="TextBox 60">
+            <a:extLst>
+              <a:ext uri="{FF2B5EF4-FFF2-40B4-BE49-F238E27FC236}">
+                <a16:creationId xmlns:a16="http://schemas.microsoft.com/office/drawing/2014/main" id="{032048B8-7B82-4B65-9353-5B7B4A0AD4C8}"/>
+              </a:ext>
+            </a:extLst>
+          </p:cNvPr>
+          <p:cNvSpPr txBox="1"/>
+          <p:nvPr/>
+        </p:nvSpPr>
+        <p:spPr>
+          <a:xfrm>
+            <a:off x="5711048" y="866740"/>
+            <a:ext cx="1940981" cy="276999"/>
+          </a:xfrm>
+          <a:prstGeom prst="rect">
+            <a:avLst/>
+          </a:prstGeom>
+          <a:noFill/>
+        </p:spPr>
+        <p:txBody>
+          <a:bodyPr wrap="none" rtlCol="0">
+            <a:spAutoFit/>
+          </a:bodyPr>
+          <a:lstStyle/>
+          <a:p>
+            <a:r>
+              <a:rPr lang="en-US" sz="1200" dirty="0">
+                <a:solidFill>
+                  <a:schemeClr val="tx1"/>
+                </a:solidFill>
+              </a:rPr>
+              <a:t>Proxies API Calls (</a:t>
+            </a:r>
+            <a:r>
+              <a:rPr lang="en-US" sz="1200" dirty="0"/>
+              <a:t>Port 5000)</a:t>
+            </a:r>
+            <a:endParaRPr lang="en-CA" sz="1200" dirty="0">
+              <a:solidFill>
+                <a:schemeClr val="tx1"/>
+              </a:solidFill>
+            </a:endParaRPr>
+          </a:p>
+        </p:txBody>
+      </p:sp>
+      <p:cxnSp>
+        <p:nvCxnSpPr>
+          <p:cNvPr id="52" name="Connector: Elbow 51">
+            <a:extLst>
+              <a:ext uri="{FF2B5EF4-FFF2-40B4-BE49-F238E27FC236}">
+                <a16:creationId xmlns:a16="http://schemas.microsoft.com/office/drawing/2014/main" id="{A14C9D10-C7BF-4E58-896F-C1F0D7DAABE2}"/>
+              </a:ext>
+            </a:extLst>
+          </p:cNvPr>
+          <p:cNvCxnSpPr>
+            <a:cxnSpLocks/>
+            <a:stCxn id="9" idx="0"/>
+            <a:endCxn id="7" idx="1"/>
+          </p:cNvCxnSpPr>
+          <p:nvPr/>
+        </p:nvCxnSpPr>
+        <p:spPr>
+          <a:xfrm rot="5400000" flipH="1" flipV="1">
+            <a:off x="5842798" y="97033"/>
+            <a:ext cx="1429719" cy="3553743"/>
+          </a:xfrm>
+          <a:prstGeom prst="bentConnector2">
+            <a:avLst/>
+          </a:prstGeom>
+          <a:ln>
+            <a:headEnd type="triangle"/>
+            <a:tailEnd type="triangle"/>
+          </a:ln>
+        </p:spPr>
+        <p:style>
+          <a:lnRef idx="1">
+            <a:schemeClr val="accent1"/>
+          </a:lnRef>
+          <a:fillRef idx="0">
+            <a:schemeClr val="accent1"/>
+          </a:fillRef>
+          <a:effectRef idx="0">
+            <a:schemeClr val="accent1"/>
+          </a:effectRef>
+          <a:fontRef idx="minor">
+            <a:schemeClr val="tx1"/>
+          </a:fontRef>
+        </p:style>
+      </p:cxnSp>
+      <p:sp>
+        <p:nvSpPr>
+          <p:cNvPr id="56" name="TextBox 55">
+            <a:extLst>
+              <a:ext uri="{FF2B5EF4-FFF2-40B4-BE49-F238E27FC236}">
+                <a16:creationId xmlns:a16="http://schemas.microsoft.com/office/drawing/2014/main" id="{E03F0E13-242C-455D-BA68-4ABE8DC0020C}"/>
+              </a:ext>
+            </a:extLst>
+          </p:cNvPr>
+          <p:cNvSpPr txBox="1"/>
+          <p:nvPr/>
+        </p:nvSpPr>
+        <p:spPr>
+          <a:xfrm>
+            <a:off x="439622" y="704995"/>
+            <a:ext cx="2116670" cy="646331"/>
+          </a:xfrm>
+          <a:prstGeom prst="rect">
+            <a:avLst/>
+          </a:prstGeom>
+          <a:noFill/>
+        </p:spPr>
+        <p:txBody>
+          <a:bodyPr wrap="none" rtlCol="0">
+            <a:spAutoFit/>
+          </a:bodyPr>
+          <a:lstStyle/>
+          <a:p>
+            <a:r>
+              <a:rPr lang="en-US" dirty="0"/>
+              <a:t>Network Traffic Flow</a:t>
+            </a:r>
+          </a:p>
+          <a:p>
+            <a:r>
+              <a:rPr lang="en-US" dirty="0"/>
+              <a:t>(Development)</a:t>
+            </a:r>
+            <a:endParaRPr lang="en-CA" dirty="0"/>
+          </a:p>
+        </p:txBody>
+      </p:sp>
+      <p:sp>
+        <p:nvSpPr>
+          <p:cNvPr id="58" name="Footer Placeholder 57">
+            <a:extLst>
+              <a:ext uri="{FF2B5EF4-FFF2-40B4-BE49-F238E27FC236}">
+                <a16:creationId xmlns:a16="http://schemas.microsoft.com/office/drawing/2014/main" id="{374AAC34-C504-4947-8D6A-B1E3B3E73828}"/>
+              </a:ext>
+            </a:extLst>
+          </p:cNvPr>
+          <p:cNvSpPr>
+            <a:spLocks noGrp="1"/>
+          </p:cNvSpPr>
+          <p:nvPr>
+            <p:ph type="ftr" sz="quarter" idx="11"/>
+          </p:nvPr>
+        </p:nvSpPr>
+        <p:spPr/>
+        <p:txBody>
+          <a:bodyPr/>
+          <a:lstStyle/>
+          <a:p>
+            <a:r>
+              <a:rPr lang="en-CA"/>
+              <a:t>Image Text Detection App</a:t>
+            </a:r>
+          </a:p>
+        </p:txBody>
+      </p:sp>
+      <p:sp>
+        <p:nvSpPr>
+          <p:cNvPr id="59" name="Slide Number Placeholder 58">
+            <a:extLst>
+              <a:ext uri="{FF2B5EF4-FFF2-40B4-BE49-F238E27FC236}">
+                <a16:creationId xmlns:a16="http://schemas.microsoft.com/office/drawing/2014/main" id="{42EB527C-E0C5-4B4A-96C4-3CBA99AA1CD7}"/>
+              </a:ext>
+            </a:extLst>
+          </p:cNvPr>
+          <p:cNvSpPr>
+            <a:spLocks noGrp="1"/>
+          </p:cNvSpPr>
+          <p:nvPr>
+            <p:ph type="sldNum" sz="quarter" idx="12"/>
+          </p:nvPr>
+        </p:nvSpPr>
+        <p:spPr/>
+        <p:txBody>
+          <a:bodyPr/>
+          <a:lstStyle/>
+          <a:p>
+            <a:fld id="{596FB5DE-5539-4DDA-BEC9-CBF0F4979FCE}" type="slidenum">
+              <a:rPr lang="en-CA" smtClean="0"/>
+              <a:t>4</a:t>
+            </a:fld>
+            <a:endParaRPr lang="en-CA"/>
+          </a:p>
+        </p:txBody>
+      </p:sp>
+    </p:spTree>
+    <p:extLst>
+      <p:ext uri="{BB962C8B-B14F-4D97-AF65-F5344CB8AC3E}">
+        <p14:creationId xmlns:p14="http://schemas.microsoft.com/office/powerpoint/2010/main" val="496842194"/>
       </p:ext>
     </p:extLst>
   </p:cSld>
@@ -4376,4 +5660,299 @@
     </a:ext>
   </a:extLst>
 </a:theme>
+</file>
+
+<file path=ppt/theme/theme2.xml><?xml version="1.0" encoding="utf-8"?>
+<a:theme xmlns:a="http://schemas.openxmlformats.org/drawingml/2006/main" name="Office Theme">
+  <a:themeElements>
+    <a:clrScheme name="Office">
+      <a:dk1>
+        <a:sysClr val="windowText" lastClr="000000"/>
+      </a:dk1>
+      <a:lt1>
+        <a:sysClr val="window" lastClr="FFFFFF"/>
+      </a:lt1>
+      <a:dk2>
+        <a:srgbClr val="44546A"/>
+      </a:dk2>
+      <a:lt2>
+        <a:srgbClr val="E7E6E6"/>
+      </a:lt2>
+      <a:accent1>
+        <a:srgbClr val="4472C4"/>
+      </a:accent1>
+      <a:accent2>
+        <a:srgbClr val="ED7D31"/>
+      </a:accent2>
+      <a:accent3>
+        <a:srgbClr val="A5A5A5"/>
+      </a:accent3>
+      <a:accent4>
+        <a:srgbClr val="FFC000"/>
+      </a:accent4>
+      <a:accent5>
+        <a:srgbClr val="5B9BD5"/>
+      </a:accent5>
+      <a:accent6>
+        <a:srgbClr val="70AD47"/>
+      </a:accent6>
+      <a:hlink>
+        <a:srgbClr val="0563C1"/>
+      </a:hlink>
+      <a:folHlink>
+        <a:srgbClr val="954F72"/>
+      </a:folHlink>
+    </a:clrScheme>
+    <a:fontScheme name="Office">
+      <a:majorFont>
+        <a:latin typeface="Calibri Light" panose="020F0302020204030204"/>
+        <a:ea typeface=""/>
+        <a:cs typeface=""/>
+        <a:font script="Jpan" typeface="游ゴシック Light"/>
+        <a:font script="Hang" typeface="맑은 고딕"/>
+        <a:font script="Hans" typeface="等线 Light"/>
+        <a:font script="Hant" typeface="新細明體"/>
+        <a:font script="Arab" typeface="Times New Roman"/>
+        <a:font script="Hebr" typeface="Times New Roman"/>
+        <a:font script="Thai" typeface="Angsana New"/>
+        <a:font script="Ethi" typeface="Nyala"/>
+        <a:font script="Beng" typeface="Vrinda"/>
+        <a:font script="Gujr" typeface="Shruti"/>
+        <a:font script="Khmr" typeface="MoolBoran"/>
+        <a:font script="Knda" typeface="Tunga"/>
+        <a:font script="Guru" typeface="Raavi"/>
+        <a:font script="Cans" typeface="Euphemia"/>
+        <a:font script="Cher" typeface="Plantagenet Cherokee"/>
+        <a:font script="Yiii" typeface="Microsoft Yi Baiti"/>
+        <a:font script="Tibt" typeface="Microsoft Himalaya"/>
+        <a:font script="Thaa" typeface="MV Boli"/>
+        <a:font script="Deva" typeface="Mangal"/>
+        <a:font script="Telu" typeface="Gautami"/>
+        <a:font script="Taml" typeface="Latha"/>
+        <a:font script="Syrc" typeface="Estrangelo Edessa"/>
+        <a:font script="Orya" typeface="Kalinga"/>
+        <a:font script="Mlym" typeface="Kartika"/>
+        <a:font script="Laoo" typeface="DokChampa"/>
+        <a:font script="Sinh" typeface="Iskoola Pota"/>
+        <a:font script="Mong" typeface="Mongolian Baiti"/>
+        <a:font script="Viet" typeface="Times New Roman"/>
+        <a:font script="Uigh" typeface="Microsoft Uighur"/>
+        <a:font script="Geor" typeface="Sylfaen"/>
+        <a:font script="Armn" typeface="Arial"/>
+        <a:font script="Bugi" typeface="Leelawadee UI"/>
+        <a:font script="Bopo" typeface="Microsoft JhengHei"/>
+        <a:font script="Java" typeface="Javanese Text"/>
+        <a:font script="Lisu" typeface="Segoe UI"/>
+        <a:font script="Mymr" typeface="Myanmar Text"/>
+        <a:font script="Nkoo" typeface="Ebrima"/>
+        <a:font script="Olck" typeface="Nirmala UI"/>
+        <a:font script="Osma" typeface="Ebrima"/>
+        <a:font script="Phag" typeface="Phagspa"/>
+        <a:font script="Syrn" typeface="Estrangelo Edessa"/>
+        <a:font script="Syrj" typeface="Estrangelo Edessa"/>
+        <a:font script="Syre" typeface="Estrangelo Edessa"/>
+        <a:font script="Sora" typeface="Nirmala UI"/>
+        <a:font script="Tale" typeface="Microsoft Tai Le"/>
+        <a:font script="Talu" typeface="Microsoft New Tai Lue"/>
+        <a:font script="Tfng" typeface="Ebrima"/>
+      </a:majorFont>
+      <a:minorFont>
+        <a:latin typeface="Calibri" panose="020F0502020204030204"/>
+        <a:ea typeface=""/>
+        <a:cs typeface=""/>
+        <a:font script="Jpan" typeface="游ゴシック"/>
+        <a:font script="Hang" typeface="맑은 고딕"/>
+        <a:font script="Hans" typeface="等线"/>
+        <a:font script="Hant" typeface="新細明體"/>
+        <a:font script="Arab" typeface="Arial"/>
+        <a:font script="Hebr" typeface="Arial"/>
+        <a:font script="Thai" typeface="Cordia New"/>
+        <a:font script="Ethi" typeface="Nyala"/>
+        <a:font script="Beng" typeface="Vrinda"/>
+        <a:font script="Gujr" typeface="Shruti"/>
+        <a:font script="Khmr" typeface="DaunPenh"/>
+        <a:font script="Knda" typeface="Tunga"/>
+        <a:font script="Guru" typeface="Raavi"/>
+        <a:font script="Cans" typeface="Euphemia"/>
+        <a:font script="Cher" typeface="Plantagenet Cherokee"/>
+        <a:font script="Yiii" typeface="Microsoft Yi Baiti"/>
+        <a:font script="Tibt" typeface="Microsoft Himalaya"/>
+        <a:font script="Thaa" typeface="MV Boli"/>
+        <a:font script="Deva" typeface="Mangal"/>
+        <a:font script="Telu" typeface="Gautami"/>
+        <a:font script="Taml" typeface="Latha"/>
+        <a:font script="Syrc" typeface="Estrangelo Edessa"/>
+        <a:font script="Orya" typeface="Kalinga"/>
+        <a:font script="Mlym" typeface="Kartika"/>
+        <a:font script="Laoo" typeface="DokChampa"/>
+        <a:font script="Sinh" typeface="Iskoola Pota"/>
+        <a:font script="Mong" typeface="Mongolian Baiti"/>
+        <a:font script="Viet" typeface="Arial"/>
+        <a:font script="Uigh" typeface="Microsoft Uighur"/>
+        <a:font script="Geor" typeface="Sylfaen"/>
+        <a:font script="Armn" typeface="Arial"/>
+        <a:font script="Bugi" typeface="Leelawadee UI"/>
+        <a:font script="Bopo" typeface="Microsoft JhengHei"/>
+        <a:font script="Java" typeface="Javanese Text"/>
+        <a:font script="Lisu" typeface="Segoe UI"/>
+        <a:font script="Mymr" typeface="Myanmar Text"/>
+        <a:font script="Nkoo" typeface="Ebrima"/>
+        <a:font script="Olck" typeface="Nirmala UI"/>
+        <a:font script="Osma" typeface="Ebrima"/>
+        <a:font script="Phag" typeface="Phagspa"/>
+        <a:font script="Syrn" typeface="Estrangelo Edessa"/>
+        <a:font script="Syrj" typeface="Estrangelo Edessa"/>
+        <a:font script="Syre" typeface="Estrangelo Edessa"/>
+        <a:font script="Sora" typeface="Nirmala UI"/>
+        <a:font script="Tale" typeface="Microsoft Tai Le"/>
+        <a:font script="Talu" typeface="Microsoft New Tai Lue"/>
+        <a:font script="Tfng" typeface="Ebrima"/>
+      </a:minorFont>
+    </a:fontScheme>
+    <a:fmtScheme name="Office">
+      <a:fillStyleLst>
+        <a:solidFill>
+          <a:schemeClr val="phClr"/>
+        </a:solidFill>
+        <a:gradFill rotWithShape="1">
+          <a:gsLst>
+            <a:gs pos="0">
+              <a:schemeClr val="phClr">
+                <a:lumMod val="110000"/>
+                <a:satMod val="105000"/>
+                <a:tint val="67000"/>
+              </a:schemeClr>
+            </a:gs>
+            <a:gs pos="50000">
+              <a:schemeClr val="phClr">
+                <a:lumMod val="105000"/>
+                <a:satMod val="103000"/>
+                <a:tint val="73000"/>
+              </a:schemeClr>
+            </a:gs>
+            <a:gs pos="100000">
+              <a:schemeClr val="phClr">
+                <a:lumMod val="105000"/>
+                <a:satMod val="109000"/>
+                <a:tint val="81000"/>
+              </a:schemeClr>
+            </a:gs>
+          </a:gsLst>
+          <a:lin ang="5400000" scaled="0"/>
+        </a:gradFill>
+        <a:gradFill rotWithShape="1">
+          <a:gsLst>
+            <a:gs pos="0">
+              <a:schemeClr val="phClr">
+                <a:satMod val="103000"/>
+                <a:lumMod val="102000"/>
+                <a:tint val="94000"/>
+              </a:schemeClr>
+            </a:gs>
+            <a:gs pos="50000">
+              <a:schemeClr val="phClr">
+                <a:satMod val="110000"/>
+                <a:lumMod val="100000"/>
+                <a:shade val="100000"/>
+              </a:schemeClr>
+            </a:gs>
+            <a:gs pos="100000">
+              <a:schemeClr val="phClr">
+                <a:lumMod val="99000"/>
+                <a:satMod val="120000"/>
+                <a:shade val="78000"/>
+              </a:schemeClr>
+            </a:gs>
+          </a:gsLst>
+          <a:lin ang="5400000" scaled="0"/>
+        </a:gradFill>
+      </a:fillStyleLst>
+      <a:lnStyleLst>
+        <a:ln w="6350" cap="flat" cmpd="sng" algn="ctr">
+          <a:solidFill>
+            <a:schemeClr val="phClr"/>
+          </a:solidFill>
+          <a:prstDash val="solid"/>
+          <a:miter lim="800000"/>
+        </a:ln>
+        <a:ln w="12700" cap="flat" cmpd="sng" algn="ctr">
+          <a:solidFill>
+            <a:schemeClr val="phClr"/>
+          </a:solidFill>
+          <a:prstDash val="solid"/>
+          <a:miter lim="800000"/>
+        </a:ln>
+        <a:ln w="19050" cap="flat" cmpd="sng" algn="ctr">
+          <a:solidFill>
+            <a:schemeClr val="phClr"/>
+          </a:solidFill>
+          <a:prstDash val="solid"/>
+          <a:miter lim="800000"/>
+        </a:ln>
+      </a:lnStyleLst>
+      <a:effectStyleLst>
+        <a:effectStyle>
+          <a:effectLst/>
+        </a:effectStyle>
+        <a:effectStyle>
+          <a:effectLst/>
+        </a:effectStyle>
+        <a:effectStyle>
+          <a:effectLst>
+            <a:outerShdw blurRad="57150" dist="19050" dir="5400000" algn="ctr" rotWithShape="0">
+              <a:srgbClr val="000000">
+                <a:alpha val="63000"/>
+              </a:srgbClr>
+            </a:outerShdw>
+          </a:effectLst>
+        </a:effectStyle>
+      </a:effectStyleLst>
+      <a:bgFillStyleLst>
+        <a:solidFill>
+          <a:schemeClr val="phClr"/>
+        </a:solidFill>
+        <a:solidFill>
+          <a:schemeClr val="phClr">
+            <a:tint val="95000"/>
+            <a:satMod val="170000"/>
+          </a:schemeClr>
+        </a:solidFill>
+        <a:gradFill rotWithShape="1">
+          <a:gsLst>
+            <a:gs pos="0">
+              <a:schemeClr val="phClr">
+                <a:tint val="93000"/>
+                <a:satMod val="150000"/>
+                <a:shade val="98000"/>
+                <a:lumMod val="102000"/>
+              </a:schemeClr>
+            </a:gs>
+            <a:gs pos="50000">
+              <a:schemeClr val="phClr">
+                <a:tint val="98000"/>
+                <a:satMod val="130000"/>
+                <a:shade val="90000"/>
+                <a:lumMod val="103000"/>
+              </a:schemeClr>
+            </a:gs>
+            <a:gs pos="100000">
+              <a:schemeClr val="phClr">
+                <a:shade val="63000"/>
+                <a:satMod val="120000"/>
+              </a:schemeClr>
+            </a:gs>
+          </a:gsLst>
+          <a:lin ang="5400000" scaled="0"/>
+        </a:gradFill>
+      </a:bgFillStyleLst>
+    </a:fmtScheme>
+  </a:themeElements>
+  <a:objectDefaults/>
+  <a:extraClrSchemeLst/>
+  <a:extLst>
+    <a:ext uri="{05A4C25C-085E-4340-85A3-A5531E510DB2}">
+      <thm15:themeFamily xmlns:thm15="http://schemas.microsoft.com/office/thememl/2012/main" name="Office Theme" id="{62F939B6-93AF-4DB8-9C6B-D6C7DFDC589F}" vid="{4A3C46E8-61CC-4603-A589-7422A47A8E4A}"/>
+    </a:ext>
+  </a:extLst>
+</a:theme>
 </file>
</xml_diff>